<commit_message>
Bài 2 - Phần 2
</commit_message>
<xml_diff>
--- a/Bài 2 - Vẽ hình cơ bản/Bài 2.pptx
+++ b/Bài 2 - Vẽ hình cơ bản/Bài 2.pptx
@@ -110,6 +110,11 @@
       </a:defRPr>
     </a:lvl9pPr>
   </p:defaultTextStyle>
+  <p:extLst>
+    <p:ext uri="{EFAFB233-063F-42B5-8137-9DF3F51BA10A}">
+      <p15:sldGuideLst xmlns:p15="http://schemas.microsoft.com/office/powerpoint/2012/main"/>
+    </p:ext>
+  </p:extLst>
 </p:presentation>
 </file>
 
@@ -260,7 +265,7 @@
           <a:p>
             <a:fld id="{187CD168-B2F8-42EE-8F80-ECEFECFA70DF}" type="datetimeFigureOut">
               <a:rPr lang="en-US" smtClean="0"/>
-              <a:t>2/21/2023</a:t>
+              <a:t>2/24/2023</a:t>
             </a:fld>
             <a:endParaRPr lang="en-US"/>
           </a:p>
@@ -458,7 +463,7 @@
           <a:p>
             <a:fld id="{187CD168-B2F8-42EE-8F80-ECEFECFA70DF}" type="datetimeFigureOut">
               <a:rPr lang="en-US" smtClean="0"/>
-              <a:t>2/21/2023</a:t>
+              <a:t>2/24/2023</a:t>
             </a:fld>
             <a:endParaRPr lang="en-US"/>
           </a:p>
@@ -666,7 +671,7 @@
           <a:p>
             <a:fld id="{187CD168-B2F8-42EE-8F80-ECEFECFA70DF}" type="datetimeFigureOut">
               <a:rPr lang="en-US" smtClean="0"/>
-              <a:t>2/21/2023</a:t>
+              <a:t>2/24/2023</a:t>
             </a:fld>
             <a:endParaRPr lang="en-US"/>
           </a:p>
@@ -864,7 +869,7 @@
           <a:p>
             <a:fld id="{187CD168-B2F8-42EE-8F80-ECEFECFA70DF}" type="datetimeFigureOut">
               <a:rPr lang="en-US" smtClean="0"/>
-              <a:t>2/21/2023</a:t>
+              <a:t>2/24/2023</a:t>
             </a:fld>
             <a:endParaRPr lang="en-US"/>
           </a:p>
@@ -1139,7 +1144,7 @@
           <a:p>
             <a:fld id="{187CD168-B2F8-42EE-8F80-ECEFECFA70DF}" type="datetimeFigureOut">
               <a:rPr lang="en-US" smtClean="0"/>
-              <a:t>2/21/2023</a:t>
+              <a:t>2/24/2023</a:t>
             </a:fld>
             <a:endParaRPr lang="en-US"/>
           </a:p>
@@ -1404,7 +1409,7 @@
           <a:p>
             <a:fld id="{187CD168-B2F8-42EE-8F80-ECEFECFA70DF}" type="datetimeFigureOut">
               <a:rPr lang="en-US" smtClean="0"/>
-              <a:t>2/21/2023</a:t>
+              <a:t>2/24/2023</a:t>
             </a:fld>
             <a:endParaRPr lang="en-US"/>
           </a:p>
@@ -1816,7 +1821,7 @@
           <a:p>
             <a:fld id="{187CD168-B2F8-42EE-8F80-ECEFECFA70DF}" type="datetimeFigureOut">
               <a:rPr lang="en-US" smtClean="0"/>
-              <a:t>2/21/2023</a:t>
+              <a:t>2/24/2023</a:t>
             </a:fld>
             <a:endParaRPr lang="en-US"/>
           </a:p>
@@ -1957,7 +1962,7 @@
           <a:p>
             <a:fld id="{187CD168-B2F8-42EE-8F80-ECEFECFA70DF}" type="datetimeFigureOut">
               <a:rPr lang="en-US" smtClean="0"/>
-              <a:t>2/21/2023</a:t>
+              <a:t>2/24/2023</a:t>
             </a:fld>
             <a:endParaRPr lang="en-US"/>
           </a:p>
@@ -2070,7 +2075,7 @@
           <a:p>
             <a:fld id="{187CD168-B2F8-42EE-8F80-ECEFECFA70DF}" type="datetimeFigureOut">
               <a:rPr lang="en-US" smtClean="0"/>
-              <a:t>2/21/2023</a:t>
+              <a:t>2/24/2023</a:t>
             </a:fld>
             <a:endParaRPr lang="en-US"/>
           </a:p>
@@ -2381,7 +2386,7 @@
           <a:p>
             <a:fld id="{187CD168-B2F8-42EE-8F80-ECEFECFA70DF}" type="datetimeFigureOut">
               <a:rPr lang="en-US" smtClean="0"/>
-              <a:t>2/21/2023</a:t>
+              <a:t>2/24/2023</a:t>
             </a:fld>
             <a:endParaRPr lang="en-US"/>
           </a:p>
@@ -2669,7 +2674,7 @@
           <a:p>
             <a:fld id="{187CD168-B2F8-42EE-8F80-ECEFECFA70DF}" type="datetimeFigureOut">
               <a:rPr lang="en-US" smtClean="0"/>
-              <a:t>2/21/2023</a:t>
+              <a:t>2/24/2023</a:t>
             </a:fld>
             <a:endParaRPr lang="en-US"/>
           </a:p>
@@ -2910,7 +2915,7 @@
           <a:p>
             <a:fld id="{187CD168-B2F8-42EE-8F80-ECEFECFA70DF}" type="datetimeFigureOut">
               <a:rPr lang="en-US" smtClean="0"/>
-              <a:t>2/21/2023</a:t>
+              <a:t>2/24/2023</a:t>
             </a:fld>
             <a:endParaRPr lang="en-US"/>
           </a:p>
@@ -3767,7 +3772,7 @@
           <a:p>
             <a:r>
               <a:rPr lang="en-US"/>
-              <a:t>Là hình có n cạnh.</a:t>
+              <a:t>Là hình có n cạnh. Các cạnh này có kích thước bằng nhau.</a:t>
             </a:r>
           </a:p>
           <a:p>

</xml_diff>

<commit_message>
Bài 2 - Phần 3: Vẽ đường tròn
</commit_message>
<xml_diff>
--- a/Bài 2 - Vẽ hình cơ bản/Bài 2.pptx
+++ b/Bài 2 - Vẽ hình cơ bản/Bài 2.pptx
@@ -265,7 +265,7 @@
           <a:p>
             <a:fld id="{187CD168-B2F8-42EE-8F80-ECEFECFA70DF}" type="datetimeFigureOut">
               <a:rPr lang="en-US" smtClean="0"/>
-              <a:t>2/24/2023</a:t>
+              <a:t>3/2/2023</a:t>
             </a:fld>
             <a:endParaRPr lang="en-US"/>
           </a:p>
@@ -463,7 +463,7 @@
           <a:p>
             <a:fld id="{187CD168-B2F8-42EE-8F80-ECEFECFA70DF}" type="datetimeFigureOut">
               <a:rPr lang="en-US" smtClean="0"/>
-              <a:t>2/24/2023</a:t>
+              <a:t>3/2/2023</a:t>
             </a:fld>
             <a:endParaRPr lang="en-US"/>
           </a:p>
@@ -671,7 +671,7 @@
           <a:p>
             <a:fld id="{187CD168-B2F8-42EE-8F80-ECEFECFA70DF}" type="datetimeFigureOut">
               <a:rPr lang="en-US" smtClean="0"/>
-              <a:t>2/24/2023</a:t>
+              <a:t>3/2/2023</a:t>
             </a:fld>
             <a:endParaRPr lang="en-US"/>
           </a:p>
@@ -869,7 +869,7 @@
           <a:p>
             <a:fld id="{187CD168-B2F8-42EE-8F80-ECEFECFA70DF}" type="datetimeFigureOut">
               <a:rPr lang="en-US" smtClean="0"/>
-              <a:t>2/24/2023</a:t>
+              <a:t>3/2/2023</a:t>
             </a:fld>
             <a:endParaRPr lang="en-US"/>
           </a:p>
@@ -1144,7 +1144,7 @@
           <a:p>
             <a:fld id="{187CD168-B2F8-42EE-8F80-ECEFECFA70DF}" type="datetimeFigureOut">
               <a:rPr lang="en-US" smtClean="0"/>
-              <a:t>2/24/2023</a:t>
+              <a:t>3/2/2023</a:t>
             </a:fld>
             <a:endParaRPr lang="en-US"/>
           </a:p>
@@ -1409,7 +1409,7 @@
           <a:p>
             <a:fld id="{187CD168-B2F8-42EE-8F80-ECEFECFA70DF}" type="datetimeFigureOut">
               <a:rPr lang="en-US" smtClean="0"/>
-              <a:t>2/24/2023</a:t>
+              <a:t>3/2/2023</a:t>
             </a:fld>
             <a:endParaRPr lang="en-US"/>
           </a:p>
@@ -1821,7 +1821,7 @@
           <a:p>
             <a:fld id="{187CD168-B2F8-42EE-8F80-ECEFECFA70DF}" type="datetimeFigureOut">
               <a:rPr lang="en-US" smtClean="0"/>
-              <a:t>2/24/2023</a:t>
+              <a:t>3/2/2023</a:t>
             </a:fld>
             <a:endParaRPr lang="en-US"/>
           </a:p>
@@ -1962,7 +1962,7 @@
           <a:p>
             <a:fld id="{187CD168-B2F8-42EE-8F80-ECEFECFA70DF}" type="datetimeFigureOut">
               <a:rPr lang="en-US" smtClean="0"/>
-              <a:t>2/24/2023</a:t>
+              <a:t>3/2/2023</a:t>
             </a:fld>
             <a:endParaRPr lang="en-US"/>
           </a:p>
@@ -2075,7 +2075,7 @@
           <a:p>
             <a:fld id="{187CD168-B2F8-42EE-8F80-ECEFECFA70DF}" type="datetimeFigureOut">
               <a:rPr lang="en-US" smtClean="0"/>
-              <a:t>2/24/2023</a:t>
+              <a:t>3/2/2023</a:t>
             </a:fld>
             <a:endParaRPr lang="en-US"/>
           </a:p>
@@ -2386,7 +2386,7 @@
           <a:p>
             <a:fld id="{187CD168-B2F8-42EE-8F80-ECEFECFA70DF}" type="datetimeFigureOut">
               <a:rPr lang="en-US" smtClean="0"/>
-              <a:t>2/24/2023</a:t>
+              <a:t>3/2/2023</a:t>
             </a:fld>
             <a:endParaRPr lang="en-US"/>
           </a:p>
@@ -2674,7 +2674,7 @@
           <a:p>
             <a:fld id="{187CD168-B2F8-42EE-8F80-ECEFECFA70DF}" type="datetimeFigureOut">
               <a:rPr lang="en-US" smtClean="0"/>
-              <a:t>2/24/2023</a:t>
+              <a:t>3/2/2023</a:t>
             </a:fld>
             <a:endParaRPr lang="en-US"/>
           </a:p>
@@ -2915,7 +2915,7 @@
           <a:p>
             <a:fld id="{187CD168-B2F8-42EE-8F80-ECEFECFA70DF}" type="datetimeFigureOut">
               <a:rPr lang="en-US" smtClean="0"/>
-              <a:t>2/24/2023</a:t>
+              <a:t>3/2/2023</a:t>
             </a:fld>
             <a:endParaRPr lang="en-US"/>
           </a:p>
@@ -3848,7 +3848,7 @@
           <a:p>
             <a:r>
               <a:rPr lang="en-US"/>
-              <a:t>5. Vẽ hình vòng tròn (Cách 1)</a:t>
+              <a:t>5. Vẽ hình đường tròn (Cách 1)</a:t>
             </a:r>
           </a:p>
         </p:txBody>
@@ -3951,7 +3951,7 @@
           <a:p>
             <a:r>
               <a:rPr lang="en-US"/>
-              <a:t>6. Vẽ hình vòng tròn (Cách 2)</a:t>
+              <a:t>6. Vẽ hình đường tròn (Cách 2)</a:t>
             </a:r>
           </a:p>
         </p:txBody>
@@ -3985,7 +3985,7 @@
           <a:p>
             <a:r>
               <a:rPr lang="en-US"/>
-              <a:t>Tất cả các điểm ở trên vòng tròn đều có khoảng cách bằng nhau so với tâm hình tròn</a:t>
+              <a:t>Tất cả các điểm ở trên đường tròn đều có khoảng cách bằng nhau so với tâm hình tròn</a:t>
             </a:r>
           </a:p>
         </p:txBody>

</xml_diff>